<commit_message>
added link to full report
</commit_message>
<xml_diff>
--- a/direct_marketing_presentation.pptx
+++ b/direct_marketing_presentation.pptx
@@ -6699,7 +6699,7 @@
                 <a:cs typeface="+mn-lt"/>
                 <a:hlinkClick r:id="rId2"/>
               </a:rPr>
-              <a:t>https://github.com/luthergit/Direct_Marketing_Analysis/blob/54dc399330231c09a5bc590142714605d9d462e2/direct_marketing_analysis_with_commentary.ipynb</a:t>
+              <a:t>https://github.com/luthergit/Direct_Marketing_Analysis/blob/main/direct_marketing_analysis_with_commentary.ipynb</a:t>
             </a:r>
             <a:endParaRPr lang="en-US" sz="1000" dirty="0">
               <a:ea typeface="+mn-lt"/>
@@ -6707,9 +6707,6 @@
             </a:endParaRPr>
           </a:p>
           <a:p>
-            <a:pPr marL="0" indent="0">
-              <a:buNone/>
-            </a:pPr>
             <a:endParaRPr lang="en-US" sz="1000" dirty="0"/>
           </a:p>
         </p:txBody>

</xml_diff>